<commit_message>
4. Session - fixes grammar in presentation and follow SOLID principle on the examples.
</commit_message>
<xml_diff>
--- a/Presentation/04Session/Clean coding.pptx
+++ b/Presentation/04Session/Clean coding.pptx
@@ -288,7 +288,7 @@
           <a:p>
             <a:fld id="{0B7E460E-7B6A-43EC-9559-4B65C65022CE}" type="datetimeFigureOut">
               <a:rPr lang="hu-HU" smtClean="0"/>
-              <a:t>2021. 11. 04.</a:t>
+              <a:t>2021. 11. 05.</a:t>
             </a:fld>
             <a:endParaRPr lang="hu-HU"/>
           </a:p>
@@ -488,7 +488,7 @@
           <a:p>
             <a:fld id="{0B7E460E-7B6A-43EC-9559-4B65C65022CE}" type="datetimeFigureOut">
               <a:rPr lang="hu-HU" smtClean="0"/>
-              <a:t>2021. 11. 04.</a:t>
+              <a:t>2021. 11. 05.</a:t>
             </a:fld>
             <a:endParaRPr lang="hu-HU"/>
           </a:p>
@@ -698,7 +698,7 @@
           <a:p>
             <a:fld id="{0B7E460E-7B6A-43EC-9559-4B65C65022CE}" type="datetimeFigureOut">
               <a:rPr lang="hu-HU" smtClean="0"/>
-              <a:t>2021. 11. 04.</a:t>
+              <a:t>2021. 11. 05.</a:t>
             </a:fld>
             <a:endParaRPr lang="hu-HU"/>
           </a:p>
@@ -898,7 +898,7 @@
           <a:p>
             <a:fld id="{0B7E460E-7B6A-43EC-9559-4B65C65022CE}" type="datetimeFigureOut">
               <a:rPr lang="hu-HU" smtClean="0"/>
-              <a:t>2021. 11. 04.</a:t>
+              <a:t>2021. 11. 05.</a:t>
             </a:fld>
             <a:endParaRPr lang="hu-HU"/>
           </a:p>
@@ -1174,7 +1174,7 @@
           <a:p>
             <a:fld id="{0B7E460E-7B6A-43EC-9559-4B65C65022CE}" type="datetimeFigureOut">
               <a:rPr lang="hu-HU" smtClean="0"/>
-              <a:t>2021. 11. 04.</a:t>
+              <a:t>2021. 11. 05.</a:t>
             </a:fld>
             <a:endParaRPr lang="hu-HU"/>
           </a:p>
@@ -1442,7 +1442,7 @@
           <a:p>
             <a:fld id="{0B7E460E-7B6A-43EC-9559-4B65C65022CE}" type="datetimeFigureOut">
               <a:rPr lang="hu-HU" smtClean="0"/>
-              <a:t>2021. 11. 04.</a:t>
+              <a:t>2021. 11. 05.</a:t>
             </a:fld>
             <a:endParaRPr lang="hu-HU"/>
           </a:p>
@@ -1857,7 +1857,7 @@
           <a:p>
             <a:fld id="{0B7E460E-7B6A-43EC-9559-4B65C65022CE}" type="datetimeFigureOut">
               <a:rPr lang="hu-HU" smtClean="0"/>
-              <a:t>2021. 11. 04.</a:t>
+              <a:t>2021. 11. 05.</a:t>
             </a:fld>
             <a:endParaRPr lang="hu-HU"/>
           </a:p>
@@ -1999,7 +1999,7 @@
           <a:p>
             <a:fld id="{0B7E460E-7B6A-43EC-9559-4B65C65022CE}" type="datetimeFigureOut">
               <a:rPr lang="hu-HU" smtClean="0"/>
-              <a:t>2021. 11. 04.</a:t>
+              <a:t>2021. 11. 05.</a:t>
             </a:fld>
             <a:endParaRPr lang="hu-HU"/>
           </a:p>
@@ -2112,7 +2112,7 @@
           <a:p>
             <a:fld id="{0B7E460E-7B6A-43EC-9559-4B65C65022CE}" type="datetimeFigureOut">
               <a:rPr lang="hu-HU" smtClean="0"/>
-              <a:t>2021. 11. 04.</a:t>
+              <a:t>2021. 11. 05.</a:t>
             </a:fld>
             <a:endParaRPr lang="hu-HU"/>
           </a:p>
@@ -2425,7 +2425,7 @@
           <a:p>
             <a:fld id="{0B7E460E-7B6A-43EC-9559-4B65C65022CE}" type="datetimeFigureOut">
               <a:rPr lang="hu-HU" smtClean="0"/>
-              <a:t>2021. 11. 04.</a:t>
+              <a:t>2021. 11. 05.</a:t>
             </a:fld>
             <a:endParaRPr lang="hu-HU"/>
           </a:p>
@@ -2714,7 +2714,7 @@
           <a:p>
             <a:fld id="{0B7E460E-7B6A-43EC-9559-4B65C65022CE}" type="datetimeFigureOut">
               <a:rPr lang="hu-HU" smtClean="0"/>
-              <a:t>2021. 11. 04.</a:t>
+              <a:t>2021. 11. 05.</a:t>
             </a:fld>
             <a:endParaRPr lang="hu-HU"/>
           </a:p>
@@ -2957,7 +2957,7 @@
           <a:p>
             <a:fld id="{0B7E460E-7B6A-43EC-9559-4B65C65022CE}" type="datetimeFigureOut">
               <a:rPr lang="hu-HU" smtClean="0"/>
-              <a:t>2021. 11. 04.</a:t>
+              <a:t>2021. 11. 05.</a:t>
             </a:fld>
             <a:endParaRPr lang="hu-HU"/>
           </a:p>
@@ -4051,6 +4051,379 @@
   <p:clrMapOvr>
     <a:masterClrMapping/>
   </p:clrMapOvr>
+  <p:timing>
+    <p:tnLst>
+      <p:par>
+        <p:cTn id="1" dur="indefinite" restart="never" nodeType="tmRoot">
+          <p:childTnLst>
+            <p:seq concurrent="1" nextAc="seek">
+              <p:cTn id="2" dur="indefinite" nodeType="mainSeq">
+                <p:childTnLst>
+                  <p:par>
+                    <p:cTn id="3" fill="hold">
+                      <p:stCondLst>
+                        <p:cond delay="indefinite"/>
+                      </p:stCondLst>
+                      <p:childTnLst>
+                        <p:par>
+                          <p:cTn id="4" fill="hold">
+                            <p:stCondLst>
+                              <p:cond delay="0"/>
+                            </p:stCondLst>
+                            <p:childTnLst>
+                              <p:par>
+                                <p:cTn id="5" presetID="1" presetClass="entr" presetSubtype="0" fill="hold" nodeType="clickEffect">
+                                  <p:stCondLst>
+                                    <p:cond delay="0"/>
+                                  </p:stCondLst>
+                                  <p:childTnLst>
+                                    <p:set>
+                                      <p:cBhvr>
+                                        <p:cTn id="6" dur="1" fill="hold">
+                                          <p:stCondLst>
+                                            <p:cond delay="0"/>
+                                          </p:stCondLst>
+                                        </p:cTn>
+                                        <p:tgtEl>
+                                          <p:spTgt spid="3">
+                                            <p:txEl>
+                                              <p:pRg st="0" end="0"/>
+                                            </p:txEl>
+                                          </p:spTgt>
+                                        </p:tgtEl>
+                                        <p:attrNameLst>
+                                          <p:attrName>style.visibility</p:attrName>
+                                        </p:attrNameLst>
+                                      </p:cBhvr>
+                                      <p:to>
+                                        <p:strVal val="visible"/>
+                                      </p:to>
+                                    </p:set>
+                                  </p:childTnLst>
+                                </p:cTn>
+                              </p:par>
+                            </p:childTnLst>
+                          </p:cTn>
+                        </p:par>
+                      </p:childTnLst>
+                    </p:cTn>
+                  </p:par>
+                  <p:par>
+                    <p:cTn id="7" fill="hold">
+                      <p:stCondLst>
+                        <p:cond delay="indefinite"/>
+                      </p:stCondLst>
+                      <p:childTnLst>
+                        <p:par>
+                          <p:cTn id="8" fill="hold">
+                            <p:stCondLst>
+                              <p:cond delay="0"/>
+                            </p:stCondLst>
+                            <p:childTnLst>
+                              <p:par>
+                                <p:cTn id="9" presetID="1" presetClass="entr" presetSubtype="0" fill="hold" nodeType="clickEffect">
+                                  <p:stCondLst>
+                                    <p:cond delay="0"/>
+                                  </p:stCondLst>
+                                  <p:childTnLst>
+                                    <p:set>
+                                      <p:cBhvr>
+                                        <p:cTn id="10" dur="1" fill="hold">
+                                          <p:stCondLst>
+                                            <p:cond delay="0"/>
+                                          </p:stCondLst>
+                                        </p:cTn>
+                                        <p:tgtEl>
+                                          <p:spTgt spid="3">
+                                            <p:txEl>
+                                              <p:pRg st="1" end="1"/>
+                                            </p:txEl>
+                                          </p:spTgt>
+                                        </p:tgtEl>
+                                        <p:attrNameLst>
+                                          <p:attrName>style.visibility</p:attrName>
+                                        </p:attrNameLst>
+                                      </p:cBhvr>
+                                      <p:to>
+                                        <p:strVal val="visible"/>
+                                      </p:to>
+                                    </p:set>
+                                  </p:childTnLst>
+                                </p:cTn>
+                              </p:par>
+                            </p:childTnLst>
+                          </p:cTn>
+                        </p:par>
+                      </p:childTnLst>
+                    </p:cTn>
+                  </p:par>
+                  <p:par>
+                    <p:cTn id="11" fill="hold">
+                      <p:stCondLst>
+                        <p:cond delay="indefinite"/>
+                      </p:stCondLst>
+                      <p:childTnLst>
+                        <p:par>
+                          <p:cTn id="12" fill="hold">
+                            <p:stCondLst>
+                              <p:cond delay="0"/>
+                            </p:stCondLst>
+                            <p:childTnLst>
+                              <p:par>
+                                <p:cTn id="13" presetID="1" presetClass="entr" presetSubtype="0" fill="hold" nodeType="clickEffect">
+                                  <p:stCondLst>
+                                    <p:cond delay="0"/>
+                                  </p:stCondLst>
+                                  <p:childTnLst>
+                                    <p:set>
+                                      <p:cBhvr>
+                                        <p:cTn id="14" dur="1" fill="hold">
+                                          <p:stCondLst>
+                                            <p:cond delay="0"/>
+                                          </p:stCondLst>
+                                        </p:cTn>
+                                        <p:tgtEl>
+                                          <p:spTgt spid="3">
+                                            <p:txEl>
+                                              <p:pRg st="2" end="2"/>
+                                            </p:txEl>
+                                          </p:spTgt>
+                                        </p:tgtEl>
+                                        <p:attrNameLst>
+                                          <p:attrName>style.visibility</p:attrName>
+                                        </p:attrNameLst>
+                                      </p:cBhvr>
+                                      <p:to>
+                                        <p:strVal val="visible"/>
+                                      </p:to>
+                                    </p:set>
+                                  </p:childTnLst>
+                                </p:cTn>
+                              </p:par>
+                            </p:childTnLst>
+                          </p:cTn>
+                        </p:par>
+                      </p:childTnLst>
+                    </p:cTn>
+                  </p:par>
+                  <p:par>
+                    <p:cTn id="15" fill="hold">
+                      <p:stCondLst>
+                        <p:cond delay="indefinite"/>
+                      </p:stCondLst>
+                      <p:childTnLst>
+                        <p:par>
+                          <p:cTn id="16" fill="hold">
+                            <p:stCondLst>
+                              <p:cond delay="0"/>
+                            </p:stCondLst>
+                            <p:childTnLst>
+                              <p:par>
+                                <p:cTn id="17" presetID="1" presetClass="entr" presetSubtype="0" fill="hold" nodeType="clickEffect">
+                                  <p:stCondLst>
+                                    <p:cond delay="0"/>
+                                  </p:stCondLst>
+                                  <p:childTnLst>
+                                    <p:set>
+                                      <p:cBhvr>
+                                        <p:cTn id="18" dur="1" fill="hold">
+                                          <p:stCondLst>
+                                            <p:cond delay="0"/>
+                                          </p:stCondLst>
+                                        </p:cTn>
+                                        <p:tgtEl>
+                                          <p:spTgt spid="3">
+                                            <p:txEl>
+                                              <p:pRg st="3" end="3"/>
+                                            </p:txEl>
+                                          </p:spTgt>
+                                        </p:tgtEl>
+                                        <p:attrNameLst>
+                                          <p:attrName>style.visibility</p:attrName>
+                                        </p:attrNameLst>
+                                      </p:cBhvr>
+                                      <p:to>
+                                        <p:strVal val="visible"/>
+                                      </p:to>
+                                    </p:set>
+                                  </p:childTnLst>
+                                </p:cTn>
+                              </p:par>
+                            </p:childTnLst>
+                          </p:cTn>
+                        </p:par>
+                      </p:childTnLst>
+                    </p:cTn>
+                  </p:par>
+                  <p:par>
+                    <p:cTn id="19" fill="hold">
+                      <p:stCondLst>
+                        <p:cond delay="indefinite"/>
+                      </p:stCondLst>
+                      <p:childTnLst>
+                        <p:par>
+                          <p:cTn id="20" fill="hold">
+                            <p:stCondLst>
+                              <p:cond delay="0"/>
+                            </p:stCondLst>
+                            <p:childTnLst>
+                              <p:par>
+                                <p:cTn id="21" presetID="1" presetClass="entr" presetSubtype="0" fill="hold" nodeType="clickEffect">
+                                  <p:stCondLst>
+                                    <p:cond delay="0"/>
+                                  </p:stCondLst>
+                                  <p:childTnLst>
+                                    <p:set>
+                                      <p:cBhvr>
+                                        <p:cTn id="22" dur="1" fill="hold">
+                                          <p:stCondLst>
+                                            <p:cond delay="0"/>
+                                          </p:stCondLst>
+                                        </p:cTn>
+                                        <p:tgtEl>
+                                          <p:spTgt spid="3">
+                                            <p:txEl>
+                                              <p:pRg st="4" end="4"/>
+                                            </p:txEl>
+                                          </p:spTgt>
+                                        </p:tgtEl>
+                                        <p:attrNameLst>
+                                          <p:attrName>style.visibility</p:attrName>
+                                        </p:attrNameLst>
+                                      </p:cBhvr>
+                                      <p:to>
+                                        <p:strVal val="visible"/>
+                                      </p:to>
+                                    </p:set>
+                                  </p:childTnLst>
+                                </p:cTn>
+                              </p:par>
+                            </p:childTnLst>
+                          </p:cTn>
+                        </p:par>
+                      </p:childTnLst>
+                    </p:cTn>
+                  </p:par>
+                  <p:par>
+                    <p:cTn id="23" fill="hold">
+                      <p:stCondLst>
+                        <p:cond delay="indefinite"/>
+                      </p:stCondLst>
+                      <p:childTnLst>
+                        <p:par>
+                          <p:cTn id="24" fill="hold">
+                            <p:stCondLst>
+                              <p:cond delay="0"/>
+                            </p:stCondLst>
+                            <p:childTnLst>
+                              <p:par>
+                                <p:cTn id="25" presetID="1" presetClass="entr" presetSubtype="0" fill="hold" nodeType="clickEffect">
+                                  <p:stCondLst>
+                                    <p:cond delay="0"/>
+                                  </p:stCondLst>
+                                  <p:childTnLst>
+                                    <p:set>
+                                      <p:cBhvr>
+                                        <p:cTn id="26" dur="1" fill="hold">
+                                          <p:stCondLst>
+                                            <p:cond delay="0"/>
+                                          </p:stCondLst>
+                                        </p:cTn>
+                                        <p:tgtEl>
+                                          <p:spTgt spid="3">
+                                            <p:txEl>
+                                              <p:pRg st="5" end="5"/>
+                                            </p:txEl>
+                                          </p:spTgt>
+                                        </p:tgtEl>
+                                        <p:attrNameLst>
+                                          <p:attrName>style.visibility</p:attrName>
+                                        </p:attrNameLst>
+                                      </p:cBhvr>
+                                      <p:to>
+                                        <p:strVal val="visible"/>
+                                      </p:to>
+                                    </p:set>
+                                  </p:childTnLst>
+                                </p:cTn>
+                              </p:par>
+                            </p:childTnLst>
+                          </p:cTn>
+                        </p:par>
+                      </p:childTnLst>
+                    </p:cTn>
+                  </p:par>
+                  <p:par>
+                    <p:cTn id="27" fill="hold">
+                      <p:stCondLst>
+                        <p:cond delay="indefinite"/>
+                      </p:stCondLst>
+                      <p:childTnLst>
+                        <p:par>
+                          <p:cTn id="28" fill="hold">
+                            <p:stCondLst>
+                              <p:cond delay="0"/>
+                            </p:stCondLst>
+                            <p:childTnLst>
+                              <p:par>
+                                <p:cTn id="29" presetID="1" presetClass="entr" presetSubtype="0" fill="hold" nodeType="clickEffect">
+                                  <p:stCondLst>
+                                    <p:cond delay="0"/>
+                                  </p:stCondLst>
+                                  <p:childTnLst>
+                                    <p:set>
+                                      <p:cBhvr>
+                                        <p:cTn id="30" dur="1" fill="hold">
+                                          <p:stCondLst>
+                                            <p:cond delay="0"/>
+                                          </p:stCondLst>
+                                        </p:cTn>
+                                        <p:tgtEl>
+                                          <p:spTgt spid="3">
+                                            <p:txEl>
+                                              <p:pRg st="6" end="6"/>
+                                            </p:txEl>
+                                          </p:spTgt>
+                                        </p:tgtEl>
+                                        <p:attrNameLst>
+                                          <p:attrName>style.visibility</p:attrName>
+                                        </p:attrNameLst>
+                                      </p:cBhvr>
+                                      <p:to>
+                                        <p:strVal val="visible"/>
+                                      </p:to>
+                                    </p:set>
+                                  </p:childTnLst>
+                                </p:cTn>
+                              </p:par>
+                            </p:childTnLst>
+                          </p:cTn>
+                        </p:par>
+                      </p:childTnLst>
+                    </p:cTn>
+                  </p:par>
+                </p:childTnLst>
+              </p:cTn>
+              <p:prevCondLst>
+                <p:cond evt="onPrev" delay="0">
+                  <p:tgtEl>
+                    <p:sldTgt/>
+                  </p:tgtEl>
+                </p:cond>
+              </p:prevCondLst>
+              <p:nextCondLst>
+                <p:cond evt="onNext" delay="0">
+                  <p:tgtEl>
+                    <p:sldTgt/>
+                  </p:tgtEl>
+                </p:cond>
+              </p:nextCondLst>
+            </p:seq>
+          </p:childTnLst>
+        </p:cTn>
+      </p:par>
+    </p:tnLst>
+  </p:timing>
 </p:sld>
 </file>
 
@@ -5515,6 +5888,232 @@
   <p:clrMapOvr>
     <a:masterClrMapping/>
   </p:clrMapOvr>
+  <p:timing>
+    <p:tnLst>
+      <p:par>
+        <p:cTn id="1" dur="indefinite" restart="never" nodeType="tmRoot">
+          <p:childTnLst>
+            <p:seq concurrent="1" nextAc="seek">
+              <p:cTn id="2" dur="indefinite" nodeType="mainSeq">
+                <p:childTnLst>
+                  <p:par>
+                    <p:cTn id="3" fill="hold">
+                      <p:stCondLst>
+                        <p:cond delay="indefinite"/>
+                      </p:stCondLst>
+                      <p:childTnLst>
+                        <p:par>
+                          <p:cTn id="4" fill="hold">
+                            <p:stCondLst>
+                              <p:cond delay="0"/>
+                            </p:stCondLst>
+                            <p:childTnLst>
+                              <p:par>
+                                <p:cTn id="5" presetID="1" presetClass="entr" presetSubtype="0" fill="hold" nodeType="clickEffect">
+                                  <p:stCondLst>
+                                    <p:cond delay="0"/>
+                                  </p:stCondLst>
+                                  <p:childTnLst>
+                                    <p:set>
+                                      <p:cBhvr>
+                                        <p:cTn id="6" dur="1" fill="hold">
+                                          <p:stCondLst>
+                                            <p:cond delay="0"/>
+                                          </p:stCondLst>
+                                        </p:cTn>
+                                        <p:tgtEl>
+                                          <p:spTgt spid="3">
+                                            <p:txEl>
+                                              <p:pRg st="1" end="1"/>
+                                            </p:txEl>
+                                          </p:spTgt>
+                                        </p:tgtEl>
+                                        <p:attrNameLst>
+                                          <p:attrName>style.visibility</p:attrName>
+                                        </p:attrNameLst>
+                                      </p:cBhvr>
+                                      <p:to>
+                                        <p:strVal val="visible"/>
+                                      </p:to>
+                                    </p:set>
+                                  </p:childTnLst>
+                                </p:cTn>
+                              </p:par>
+                            </p:childTnLst>
+                          </p:cTn>
+                        </p:par>
+                      </p:childTnLst>
+                    </p:cTn>
+                  </p:par>
+                  <p:par>
+                    <p:cTn id="7" fill="hold">
+                      <p:stCondLst>
+                        <p:cond delay="indefinite"/>
+                      </p:stCondLst>
+                      <p:childTnLst>
+                        <p:par>
+                          <p:cTn id="8" fill="hold">
+                            <p:stCondLst>
+                              <p:cond delay="0"/>
+                            </p:stCondLst>
+                            <p:childTnLst>
+                              <p:par>
+                                <p:cTn id="9" presetID="1" presetClass="entr" presetSubtype="0" fill="hold" nodeType="clickEffect">
+                                  <p:stCondLst>
+                                    <p:cond delay="0"/>
+                                  </p:stCondLst>
+                                  <p:childTnLst>
+                                    <p:set>
+                                      <p:cBhvr>
+                                        <p:cTn id="10" dur="1" fill="hold">
+                                          <p:stCondLst>
+                                            <p:cond delay="0"/>
+                                          </p:stCondLst>
+                                        </p:cTn>
+                                        <p:tgtEl>
+                                          <p:spTgt spid="3">
+                                            <p:txEl>
+                                              <p:pRg st="2" end="2"/>
+                                            </p:txEl>
+                                          </p:spTgt>
+                                        </p:tgtEl>
+                                        <p:attrNameLst>
+                                          <p:attrName>style.visibility</p:attrName>
+                                        </p:attrNameLst>
+                                      </p:cBhvr>
+                                      <p:to>
+                                        <p:strVal val="visible"/>
+                                      </p:to>
+                                    </p:set>
+                                  </p:childTnLst>
+                                </p:cTn>
+                              </p:par>
+                            </p:childTnLst>
+                          </p:cTn>
+                        </p:par>
+                      </p:childTnLst>
+                    </p:cTn>
+                  </p:par>
+                  <p:par>
+                    <p:cTn id="11" fill="hold">
+                      <p:stCondLst>
+                        <p:cond delay="indefinite"/>
+                      </p:stCondLst>
+                      <p:childTnLst>
+                        <p:par>
+                          <p:cTn id="12" fill="hold">
+                            <p:stCondLst>
+                              <p:cond delay="0"/>
+                            </p:stCondLst>
+                            <p:childTnLst>
+                              <p:par>
+                                <p:cTn id="13" presetID="1" presetClass="entr" presetSubtype="0" fill="hold" nodeType="clickEffect">
+                                  <p:stCondLst>
+                                    <p:cond delay="0"/>
+                                  </p:stCondLst>
+                                  <p:childTnLst>
+                                    <p:set>
+                                      <p:cBhvr>
+                                        <p:cTn id="14" dur="1" fill="hold">
+                                          <p:stCondLst>
+                                            <p:cond delay="0"/>
+                                          </p:stCondLst>
+                                        </p:cTn>
+                                        <p:tgtEl>
+                                          <p:spTgt spid="3">
+                                            <p:txEl>
+                                              <p:pRg st="3" end="3"/>
+                                            </p:txEl>
+                                          </p:spTgt>
+                                        </p:tgtEl>
+                                        <p:attrNameLst>
+                                          <p:attrName>style.visibility</p:attrName>
+                                        </p:attrNameLst>
+                                      </p:cBhvr>
+                                      <p:to>
+                                        <p:strVal val="visible"/>
+                                      </p:to>
+                                    </p:set>
+                                  </p:childTnLst>
+                                </p:cTn>
+                              </p:par>
+                            </p:childTnLst>
+                          </p:cTn>
+                        </p:par>
+                      </p:childTnLst>
+                    </p:cTn>
+                  </p:par>
+                  <p:par>
+                    <p:cTn id="15" fill="hold">
+                      <p:stCondLst>
+                        <p:cond delay="indefinite"/>
+                      </p:stCondLst>
+                      <p:childTnLst>
+                        <p:par>
+                          <p:cTn id="16" fill="hold">
+                            <p:stCondLst>
+                              <p:cond delay="0"/>
+                            </p:stCondLst>
+                            <p:childTnLst>
+                              <p:par>
+                                <p:cTn id="17" presetID="1" presetClass="entr" presetSubtype="0" fill="hold" nodeType="clickEffect">
+                                  <p:stCondLst>
+                                    <p:cond delay="0"/>
+                                  </p:stCondLst>
+                                  <p:childTnLst>
+                                    <p:set>
+                                      <p:cBhvr>
+                                        <p:cTn id="18" dur="1" fill="hold">
+                                          <p:stCondLst>
+                                            <p:cond delay="0"/>
+                                          </p:stCondLst>
+                                        </p:cTn>
+                                        <p:tgtEl>
+                                          <p:spTgt spid="3">
+                                            <p:txEl>
+                                              <p:pRg st="4" end="4"/>
+                                            </p:txEl>
+                                          </p:spTgt>
+                                        </p:tgtEl>
+                                        <p:attrNameLst>
+                                          <p:attrName>style.visibility</p:attrName>
+                                        </p:attrNameLst>
+                                      </p:cBhvr>
+                                      <p:to>
+                                        <p:strVal val="visible"/>
+                                      </p:to>
+                                    </p:set>
+                                  </p:childTnLst>
+                                </p:cTn>
+                              </p:par>
+                            </p:childTnLst>
+                          </p:cTn>
+                        </p:par>
+                      </p:childTnLst>
+                    </p:cTn>
+                  </p:par>
+                </p:childTnLst>
+              </p:cTn>
+              <p:prevCondLst>
+                <p:cond evt="onPrev" delay="0">
+                  <p:tgtEl>
+                    <p:sldTgt/>
+                  </p:tgtEl>
+                </p:cond>
+              </p:prevCondLst>
+              <p:nextCondLst>
+                <p:cond evt="onNext" delay="0">
+                  <p:tgtEl>
+                    <p:sldTgt/>
+                  </p:tgtEl>
+                </p:cond>
+              </p:nextCondLst>
+            </p:seq>
+          </p:childTnLst>
+        </p:cTn>
+      </p:par>
+    </p:tnLst>
+  </p:timing>
 </p:sld>
 </file>
 
@@ -7131,7 +7730,7 @@
           <a:p>
             <a:r>
               <a:rPr lang="en-US" b="1" dirty="0" err="1"/>
-              <a:t>Oszályok</a:t>
+              <a:t>Osztályok</a:t>
             </a:r>
             <a:endParaRPr lang="hu-HU" b="1" dirty="0"/>
           </a:p>
@@ -7285,7 +7884,7 @@
           <a:p>
             <a:r>
               <a:rPr lang="en-US" b="1" dirty="0" err="1"/>
-              <a:t>Oszályok</a:t>
+              <a:t>Osztályok</a:t>
             </a:r>
             <a:endParaRPr lang="hu-HU" dirty="0"/>
           </a:p>
@@ -7421,6 +8020,281 @@
   <p:clrMapOvr>
     <a:masterClrMapping/>
   </p:clrMapOvr>
+  <p:timing>
+    <p:tnLst>
+      <p:par>
+        <p:cTn id="1" dur="indefinite" restart="never" nodeType="tmRoot">
+          <p:childTnLst>
+            <p:seq concurrent="1" nextAc="seek">
+              <p:cTn id="2" dur="indefinite" nodeType="mainSeq">
+                <p:childTnLst>
+                  <p:par>
+                    <p:cTn id="3" fill="hold">
+                      <p:stCondLst>
+                        <p:cond delay="indefinite"/>
+                      </p:stCondLst>
+                      <p:childTnLst>
+                        <p:par>
+                          <p:cTn id="4" fill="hold">
+                            <p:stCondLst>
+                              <p:cond delay="0"/>
+                            </p:stCondLst>
+                            <p:childTnLst>
+                              <p:par>
+                                <p:cTn id="5" presetID="1" presetClass="entr" presetSubtype="0" fill="hold" nodeType="clickEffect">
+                                  <p:stCondLst>
+                                    <p:cond delay="0"/>
+                                  </p:stCondLst>
+                                  <p:childTnLst>
+                                    <p:set>
+                                      <p:cBhvr>
+                                        <p:cTn id="6" dur="1" fill="hold">
+                                          <p:stCondLst>
+                                            <p:cond delay="0"/>
+                                          </p:stCondLst>
+                                        </p:cTn>
+                                        <p:tgtEl>
+                                          <p:spTgt spid="3">
+                                            <p:txEl>
+                                              <p:pRg st="1" end="1"/>
+                                            </p:txEl>
+                                          </p:spTgt>
+                                        </p:tgtEl>
+                                        <p:attrNameLst>
+                                          <p:attrName>style.visibility</p:attrName>
+                                        </p:attrNameLst>
+                                      </p:cBhvr>
+                                      <p:to>
+                                        <p:strVal val="visible"/>
+                                      </p:to>
+                                    </p:set>
+                                  </p:childTnLst>
+                                </p:cTn>
+                              </p:par>
+                            </p:childTnLst>
+                          </p:cTn>
+                        </p:par>
+                      </p:childTnLst>
+                    </p:cTn>
+                  </p:par>
+                  <p:par>
+                    <p:cTn id="7" fill="hold">
+                      <p:stCondLst>
+                        <p:cond delay="indefinite"/>
+                      </p:stCondLst>
+                      <p:childTnLst>
+                        <p:par>
+                          <p:cTn id="8" fill="hold">
+                            <p:stCondLst>
+                              <p:cond delay="0"/>
+                            </p:stCondLst>
+                            <p:childTnLst>
+                              <p:par>
+                                <p:cTn id="9" presetID="1" presetClass="entr" presetSubtype="0" fill="hold" nodeType="clickEffect">
+                                  <p:stCondLst>
+                                    <p:cond delay="0"/>
+                                  </p:stCondLst>
+                                  <p:childTnLst>
+                                    <p:set>
+                                      <p:cBhvr>
+                                        <p:cTn id="10" dur="1" fill="hold">
+                                          <p:stCondLst>
+                                            <p:cond delay="0"/>
+                                          </p:stCondLst>
+                                        </p:cTn>
+                                        <p:tgtEl>
+                                          <p:spTgt spid="3">
+                                            <p:txEl>
+                                              <p:pRg st="2" end="2"/>
+                                            </p:txEl>
+                                          </p:spTgt>
+                                        </p:tgtEl>
+                                        <p:attrNameLst>
+                                          <p:attrName>style.visibility</p:attrName>
+                                        </p:attrNameLst>
+                                      </p:cBhvr>
+                                      <p:to>
+                                        <p:strVal val="visible"/>
+                                      </p:to>
+                                    </p:set>
+                                  </p:childTnLst>
+                                </p:cTn>
+                              </p:par>
+                            </p:childTnLst>
+                          </p:cTn>
+                        </p:par>
+                      </p:childTnLst>
+                    </p:cTn>
+                  </p:par>
+                  <p:par>
+                    <p:cTn id="11" fill="hold">
+                      <p:stCondLst>
+                        <p:cond delay="indefinite"/>
+                      </p:stCondLst>
+                      <p:childTnLst>
+                        <p:par>
+                          <p:cTn id="12" fill="hold">
+                            <p:stCondLst>
+                              <p:cond delay="0"/>
+                            </p:stCondLst>
+                            <p:childTnLst>
+                              <p:par>
+                                <p:cTn id="13" presetID="1" presetClass="entr" presetSubtype="0" fill="hold" nodeType="clickEffect">
+                                  <p:stCondLst>
+                                    <p:cond delay="0"/>
+                                  </p:stCondLst>
+                                  <p:childTnLst>
+                                    <p:set>
+                                      <p:cBhvr>
+                                        <p:cTn id="14" dur="1" fill="hold">
+                                          <p:stCondLst>
+                                            <p:cond delay="0"/>
+                                          </p:stCondLst>
+                                        </p:cTn>
+                                        <p:tgtEl>
+                                          <p:spTgt spid="3">
+                                            <p:txEl>
+                                              <p:pRg st="3" end="3"/>
+                                            </p:txEl>
+                                          </p:spTgt>
+                                        </p:tgtEl>
+                                        <p:attrNameLst>
+                                          <p:attrName>style.visibility</p:attrName>
+                                        </p:attrNameLst>
+                                      </p:cBhvr>
+                                      <p:to>
+                                        <p:strVal val="visible"/>
+                                      </p:to>
+                                    </p:set>
+                                  </p:childTnLst>
+                                </p:cTn>
+                              </p:par>
+                            </p:childTnLst>
+                          </p:cTn>
+                        </p:par>
+                      </p:childTnLst>
+                    </p:cTn>
+                  </p:par>
+                  <p:par>
+                    <p:cTn id="15" fill="hold">
+                      <p:stCondLst>
+                        <p:cond delay="indefinite"/>
+                      </p:stCondLst>
+                      <p:childTnLst>
+                        <p:par>
+                          <p:cTn id="16" fill="hold">
+                            <p:stCondLst>
+                              <p:cond delay="0"/>
+                            </p:stCondLst>
+                            <p:childTnLst>
+                              <p:par>
+                                <p:cTn id="17" presetID="1" presetClass="entr" presetSubtype="0" fill="hold" nodeType="clickEffect">
+                                  <p:stCondLst>
+                                    <p:cond delay="0"/>
+                                  </p:stCondLst>
+                                  <p:childTnLst>
+                                    <p:set>
+                                      <p:cBhvr>
+                                        <p:cTn id="18" dur="1" fill="hold">
+                                          <p:stCondLst>
+                                            <p:cond delay="0"/>
+                                          </p:stCondLst>
+                                        </p:cTn>
+                                        <p:tgtEl>
+                                          <p:spTgt spid="3">
+                                            <p:txEl>
+                                              <p:pRg st="4" end="4"/>
+                                            </p:txEl>
+                                          </p:spTgt>
+                                        </p:tgtEl>
+                                        <p:attrNameLst>
+                                          <p:attrName>style.visibility</p:attrName>
+                                        </p:attrNameLst>
+                                      </p:cBhvr>
+                                      <p:to>
+                                        <p:strVal val="visible"/>
+                                      </p:to>
+                                    </p:set>
+                                  </p:childTnLst>
+                                </p:cTn>
+                              </p:par>
+                            </p:childTnLst>
+                          </p:cTn>
+                        </p:par>
+                      </p:childTnLst>
+                    </p:cTn>
+                  </p:par>
+                  <p:par>
+                    <p:cTn id="19" fill="hold">
+                      <p:stCondLst>
+                        <p:cond delay="indefinite"/>
+                      </p:stCondLst>
+                      <p:childTnLst>
+                        <p:par>
+                          <p:cTn id="20" fill="hold">
+                            <p:stCondLst>
+                              <p:cond delay="0"/>
+                            </p:stCondLst>
+                            <p:childTnLst>
+                              <p:par>
+                                <p:cTn id="21" presetID="1" presetClass="entr" presetSubtype="0" fill="hold" nodeType="clickEffect">
+                                  <p:stCondLst>
+                                    <p:cond delay="0"/>
+                                  </p:stCondLst>
+                                  <p:childTnLst>
+                                    <p:set>
+                                      <p:cBhvr>
+                                        <p:cTn id="22" dur="1" fill="hold">
+                                          <p:stCondLst>
+                                            <p:cond delay="0"/>
+                                          </p:stCondLst>
+                                        </p:cTn>
+                                        <p:tgtEl>
+                                          <p:spTgt spid="3">
+                                            <p:txEl>
+                                              <p:pRg st="5" end="5"/>
+                                            </p:txEl>
+                                          </p:spTgt>
+                                        </p:tgtEl>
+                                        <p:attrNameLst>
+                                          <p:attrName>style.visibility</p:attrName>
+                                        </p:attrNameLst>
+                                      </p:cBhvr>
+                                      <p:to>
+                                        <p:strVal val="visible"/>
+                                      </p:to>
+                                    </p:set>
+                                  </p:childTnLst>
+                                </p:cTn>
+                              </p:par>
+                            </p:childTnLst>
+                          </p:cTn>
+                        </p:par>
+                      </p:childTnLst>
+                    </p:cTn>
+                  </p:par>
+                </p:childTnLst>
+              </p:cTn>
+              <p:prevCondLst>
+                <p:cond evt="onPrev" delay="0">
+                  <p:tgtEl>
+                    <p:sldTgt/>
+                  </p:tgtEl>
+                </p:cond>
+              </p:prevCondLst>
+              <p:nextCondLst>
+                <p:cond evt="onNext" delay="0">
+                  <p:tgtEl>
+                    <p:sldTgt/>
+                  </p:tgtEl>
+                </p:cond>
+              </p:nextCondLst>
+            </p:seq>
+          </p:childTnLst>
+        </p:cTn>
+      </p:par>
+    </p:tnLst>
+  </p:timing>
 </p:sld>
 </file>
 
@@ -7464,7 +8338,7 @@
           <a:p>
             <a:r>
               <a:rPr lang="en-US" b="1" dirty="0" err="1"/>
-              <a:t>Oszályok</a:t>
+              <a:t>Osztályok</a:t>
             </a:r>
             <a:r>
               <a:rPr lang="en-US" b="1" dirty="0"/>
@@ -7555,6 +8429,126 @@
   <p:clrMapOvr>
     <a:masterClrMapping/>
   </p:clrMapOvr>
+  <p:timing>
+    <p:tnLst>
+      <p:par>
+        <p:cTn id="1" dur="indefinite" restart="never" nodeType="tmRoot">
+          <p:childTnLst>
+            <p:seq concurrent="1" nextAc="seek">
+              <p:cTn id="2" dur="indefinite" nodeType="mainSeq">
+                <p:childTnLst>
+                  <p:par>
+                    <p:cTn id="3" fill="hold">
+                      <p:stCondLst>
+                        <p:cond delay="indefinite"/>
+                      </p:stCondLst>
+                      <p:childTnLst>
+                        <p:par>
+                          <p:cTn id="4" fill="hold">
+                            <p:stCondLst>
+                              <p:cond delay="0"/>
+                            </p:stCondLst>
+                            <p:childTnLst>
+                              <p:par>
+                                <p:cTn id="5" presetID="1" presetClass="entr" presetSubtype="0" fill="hold" nodeType="clickEffect">
+                                  <p:stCondLst>
+                                    <p:cond delay="0"/>
+                                  </p:stCondLst>
+                                  <p:childTnLst>
+                                    <p:set>
+                                      <p:cBhvr>
+                                        <p:cTn id="6" dur="1" fill="hold">
+                                          <p:stCondLst>
+                                            <p:cond delay="0"/>
+                                          </p:stCondLst>
+                                        </p:cTn>
+                                        <p:tgtEl>
+                                          <p:spTgt spid="5"/>
+                                        </p:tgtEl>
+                                        <p:attrNameLst>
+                                          <p:attrName>style.visibility</p:attrName>
+                                        </p:attrNameLst>
+                                      </p:cBhvr>
+                                      <p:to>
+                                        <p:strVal val="visible"/>
+                                      </p:to>
+                                    </p:set>
+                                  </p:childTnLst>
+                                </p:cTn>
+                              </p:par>
+                            </p:childTnLst>
+                          </p:cTn>
+                        </p:par>
+                      </p:childTnLst>
+                    </p:cTn>
+                  </p:par>
+                  <p:par>
+                    <p:cTn id="7" fill="hold">
+                      <p:stCondLst>
+                        <p:cond delay="indefinite"/>
+                      </p:stCondLst>
+                      <p:childTnLst>
+                        <p:par>
+                          <p:cTn id="8" fill="hold">
+                            <p:stCondLst>
+                              <p:cond delay="0"/>
+                            </p:stCondLst>
+                            <p:childTnLst>
+                              <p:par>
+                                <p:cTn id="9" presetID="1" presetClass="entr" presetSubtype="0" fill="hold" nodeType="clickEffect">
+                                  <p:stCondLst>
+                                    <p:cond delay="0"/>
+                                  </p:stCondLst>
+                                  <p:childTnLst>
+                                    <p:set>
+                                      <p:cBhvr>
+                                        <p:cTn id="10" dur="1" fill="hold">
+                                          <p:stCondLst>
+                                            <p:cond delay="0"/>
+                                          </p:stCondLst>
+                                        </p:cTn>
+                                        <p:tgtEl>
+                                          <p:spTgt spid="7"/>
+                                        </p:tgtEl>
+                                        <p:attrNameLst>
+                                          <p:attrName>style.visibility</p:attrName>
+                                        </p:attrNameLst>
+                                      </p:cBhvr>
+                                      <p:to>
+                                        <p:strVal val="visible"/>
+                                      </p:to>
+                                    </p:set>
+                                  </p:childTnLst>
+                                </p:cTn>
+                              </p:par>
+                            </p:childTnLst>
+                          </p:cTn>
+                        </p:par>
+                      </p:childTnLst>
+                    </p:cTn>
+                  </p:par>
+                </p:childTnLst>
+              </p:cTn>
+              <p:prevCondLst>
+                <p:cond evt="onPrev" delay="0">
+                  <p:tgtEl>
+                    <p:sldTgt/>
+                  </p:tgtEl>
+                </p:cond>
+              </p:prevCondLst>
+              <p:nextCondLst>
+                <p:cond evt="onNext" delay="0">
+                  <p:tgtEl>
+                    <p:sldTgt/>
+                  </p:tgtEl>
+                </p:cond>
+              </p:nextCondLst>
+            </p:seq>
+          </p:childTnLst>
+        </p:cTn>
+      </p:par>
+    </p:tnLst>
+  </p:timing>
 </p:sld>
 </file>
 
@@ -7598,7 +8592,7 @@
           <a:p>
             <a:r>
               <a:rPr lang="en-US" b="1" dirty="0" err="1"/>
-              <a:t>Oszályok</a:t>
+              <a:t>Osztályok</a:t>
             </a:r>
             <a:r>
               <a:rPr lang="en-US" b="1" dirty="0"/>
@@ -7870,6 +8864,608 @@
   <p:clrMapOvr>
     <a:masterClrMapping/>
   </p:clrMapOvr>
+  <p:timing>
+    <p:tnLst>
+      <p:par>
+        <p:cTn id="1" dur="indefinite" restart="never" nodeType="tmRoot">
+          <p:childTnLst>
+            <p:seq concurrent="1" nextAc="seek">
+              <p:cTn id="2" dur="indefinite" nodeType="mainSeq">
+                <p:childTnLst>
+                  <p:par>
+                    <p:cTn id="3" fill="hold">
+                      <p:stCondLst>
+                        <p:cond delay="indefinite"/>
+                      </p:stCondLst>
+                      <p:childTnLst>
+                        <p:par>
+                          <p:cTn id="4" fill="hold">
+                            <p:stCondLst>
+                              <p:cond delay="0"/>
+                            </p:stCondLst>
+                            <p:childTnLst>
+                              <p:par>
+                                <p:cTn id="5" presetID="1" presetClass="entr" presetSubtype="0" fill="hold" grpId="0" nodeType="clickEffect">
+                                  <p:stCondLst>
+                                    <p:cond delay="0"/>
+                                  </p:stCondLst>
+                                  <p:childTnLst>
+                                    <p:set>
+                                      <p:cBhvr>
+                                        <p:cTn id="6" dur="1" fill="hold">
+                                          <p:stCondLst>
+                                            <p:cond delay="0"/>
+                                          </p:stCondLst>
+                                        </p:cTn>
+                                        <p:tgtEl>
+                                          <p:spTgt spid="4">
+                                            <p:txEl>
+                                              <p:pRg st="0" end="0"/>
+                                            </p:txEl>
+                                          </p:spTgt>
+                                        </p:tgtEl>
+                                        <p:attrNameLst>
+                                          <p:attrName>style.visibility</p:attrName>
+                                        </p:attrNameLst>
+                                      </p:cBhvr>
+                                      <p:to>
+                                        <p:strVal val="visible"/>
+                                      </p:to>
+                                    </p:set>
+                                  </p:childTnLst>
+                                </p:cTn>
+                              </p:par>
+                              <p:par>
+                                <p:cTn id="7" presetID="1" presetClass="entr" presetSubtype="0" fill="hold" grpId="0" nodeType="withEffect">
+                                  <p:stCondLst>
+                                    <p:cond delay="0"/>
+                                  </p:stCondLst>
+                                  <p:childTnLst>
+                                    <p:set>
+                                      <p:cBhvr>
+                                        <p:cTn id="8" dur="1" fill="hold">
+                                          <p:stCondLst>
+                                            <p:cond delay="0"/>
+                                          </p:stCondLst>
+                                        </p:cTn>
+                                        <p:tgtEl>
+                                          <p:spTgt spid="4">
+                                            <p:txEl>
+                                              <p:pRg st="1" end="1"/>
+                                            </p:txEl>
+                                          </p:spTgt>
+                                        </p:tgtEl>
+                                        <p:attrNameLst>
+                                          <p:attrName>style.visibility</p:attrName>
+                                        </p:attrNameLst>
+                                      </p:cBhvr>
+                                      <p:to>
+                                        <p:strVal val="visible"/>
+                                      </p:to>
+                                    </p:set>
+                                  </p:childTnLst>
+                                </p:cTn>
+                              </p:par>
+                              <p:par>
+                                <p:cTn id="9" presetID="1" presetClass="entr" presetSubtype="0" fill="hold" grpId="0" nodeType="withEffect">
+                                  <p:stCondLst>
+                                    <p:cond delay="0"/>
+                                  </p:stCondLst>
+                                  <p:childTnLst>
+                                    <p:set>
+                                      <p:cBhvr>
+                                        <p:cTn id="10" dur="1" fill="hold">
+                                          <p:stCondLst>
+                                            <p:cond delay="0"/>
+                                          </p:stCondLst>
+                                        </p:cTn>
+                                        <p:tgtEl>
+                                          <p:spTgt spid="4">
+                                            <p:txEl>
+                                              <p:pRg st="2" end="2"/>
+                                            </p:txEl>
+                                          </p:spTgt>
+                                        </p:tgtEl>
+                                        <p:attrNameLst>
+                                          <p:attrName>style.visibility</p:attrName>
+                                        </p:attrNameLst>
+                                      </p:cBhvr>
+                                      <p:to>
+                                        <p:strVal val="visible"/>
+                                      </p:to>
+                                    </p:set>
+                                  </p:childTnLst>
+                                </p:cTn>
+                              </p:par>
+                              <p:par>
+                                <p:cTn id="11" presetID="1" presetClass="entr" presetSubtype="0" fill="hold" grpId="0" nodeType="withEffect">
+                                  <p:stCondLst>
+                                    <p:cond delay="0"/>
+                                  </p:stCondLst>
+                                  <p:childTnLst>
+                                    <p:set>
+                                      <p:cBhvr>
+                                        <p:cTn id="12" dur="1" fill="hold">
+                                          <p:stCondLst>
+                                            <p:cond delay="0"/>
+                                          </p:stCondLst>
+                                        </p:cTn>
+                                        <p:tgtEl>
+                                          <p:spTgt spid="4">
+                                            <p:txEl>
+                                              <p:pRg st="3" end="3"/>
+                                            </p:txEl>
+                                          </p:spTgt>
+                                        </p:tgtEl>
+                                        <p:attrNameLst>
+                                          <p:attrName>style.visibility</p:attrName>
+                                        </p:attrNameLst>
+                                      </p:cBhvr>
+                                      <p:to>
+                                        <p:strVal val="visible"/>
+                                      </p:to>
+                                    </p:set>
+                                  </p:childTnLst>
+                                </p:cTn>
+                              </p:par>
+                              <p:par>
+                                <p:cTn id="13" presetID="1" presetClass="entr" presetSubtype="0" fill="hold" grpId="0" nodeType="withEffect">
+                                  <p:stCondLst>
+                                    <p:cond delay="0"/>
+                                  </p:stCondLst>
+                                  <p:childTnLst>
+                                    <p:set>
+                                      <p:cBhvr>
+                                        <p:cTn id="14" dur="1" fill="hold">
+                                          <p:stCondLst>
+                                            <p:cond delay="0"/>
+                                          </p:stCondLst>
+                                        </p:cTn>
+                                        <p:tgtEl>
+                                          <p:spTgt spid="4">
+                                            <p:txEl>
+                                              <p:pRg st="4" end="4"/>
+                                            </p:txEl>
+                                          </p:spTgt>
+                                        </p:tgtEl>
+                                        <p:attrNameLst>
+                                          <p:attrName>style.visibility</p:attrName>
+                                        </p:attrNameLst>
+                                      </p:cBhvr>
+                                      <p:to>
+                                        <p:strVal val="visible"/>
+                                      </p:to>
+                                    </p:set>
+                                  </p:childTnLst>
+                                </p:cTn>
+                              </p:par>
+                              <p:par>
+                                <p:cTn id="15" presetID="1" presetClass="entr" presetSubtype="0" fill="hold" grpId="0" nodeType="withEffect">
+                                  <p:stCondLst>
+                                    <p:cond delay="0"/>
+                                  </p:stCondLst>
+                                  <p:childTnLst>
+                                    <p:set>
+                                      <p:cBhvr>
+                                        <p:cTn id="16" dur="1" fill="hold">
+                                          <p:stCondLst>
+                                            <p:cond delay="0"/>
+                                          </p:stCondLst>
+                                        </p:cTn>
+                                        <p:tgtEl>
+                                          <p:spTgt spid="4">
+                                            <p:txEl>
+                                              <p:pRg st="5" end="5"/>
+                                            </p:txEl>
+                                          </p:spTgt>
+                                        </p:tgtEl>
+                                        <p:attrNameLst>
+                                          <p:attrName>style.visibility</p:attrName>
+                                        </p:attrNameLst>
+                                      </p:cBhvr>
+                                      <p:to>
+                                        <p:strVal val="visible"/>
+                                      </p:to>
+                                    </p:set>
+                                  </p:childTnLst>
+                                </p:cTn>
+                              </p:par>
+                              <p:par>
+                                <p:cTn id="17" presetID="1" presetClass="entr" presetSubtype="0" fill="hold" grpId="0" nodeType="withEffect">
+                                  <p:stCondLst>
+                                    <p:cond delay="0"/>
+                                  </p:stCondLst>
+                                  <p:childTnLst>
+                                    <p:set>
+                                      <p:cBhvr>
+                                        <p:cTn id="18" dur="1" fill="hold">
+                                          <p:stCondLst>
+                                            <p:cond delay="0"/>
+                                          </p:stCondLst>
+                                        </p:cTn>
+                                        <p:tgtEl>
+                                          <p:spTgt spid="4">
+                                            <p:txEl>
+                                              <p:pRg st="6" end="6"/>
+                                            </p:txEl>
+                                          </p:spTgt>
+                                        </p:tgtEl>
+                                        <p:attrNameLst>
+                                          <p:attrName>style.visibility</p:attrName>
+                                        </p:attrNameLst>
+                                      </p:cBhvr>
+                                      <p:to>
+                                        <p:strVal val="visible"/>
+                                      </p:to>
+                                    </p:set>
+                                  </p:childTnLst>
+                                </p:cTn>
+                              </p:par>
+                            </p:childTnLst>
+                          </p:cTn>
+                        </p:par>
+                      </p:childTnLst>
+                    </p:cTn>
+                  </p:par>
+                  <p:par>
+                    <p:cTn id="19" fill="hold">
+                      <p:stCondLst>
+                        <p:cond delay="indefinite"/>
+                      </p:stCondLst>
+                      <p:childTnLst>
+                        <p:par>
+                          <p:cTn id="20" fill="hold">
+                            <p:stCondLst>
+                              <p:cond delay="0"/>
+                            </p:stCondLst>
+                            <p:childTnLst>
+                              <p:par>
+                                <p:cTn id="21" presetID="1" presetClass="entr" presetSubtype="0" fill="hold" grpId="0" nodeType="clickEffect">
+                                  <p:stCondLst>
+                                    <p:cond delay="0"/>
+                                  </p:stCondLst>
+                                  <p:childTnLst>
+                                    <p:set>
+                                      <p:cBhvr>
+                                        <p:cTn id="22" dur="1" fill="hold">
+                                          <p:stCondLst>
+                                            <p:cond delay="0"/>
+                                          </p:stCondLst>
+                                        </p:cTn>
+                                        <p:tgtEl>
+                                          <p:spTgt spid="6">
+                                            <p:txEl>
+                                              <p:pRg st="0" end="0"/>
+                                            </p:txEl>
+                                          </p:spTgt>
+                                        </p:tgtEl>
+                                        <p:attrNameLst>
+                                          <p:attrName>style.visibility</p:attrName>
+                                        </p:attrNameLst>
+                                      </p:cBhvr>
+                                      <p:to>
+                                        <p:strVal val="visible"/>
+                                      </p:to>
+                                    </p:set>
+                                  </p:childTnLst>
+                                </p:cTn>
+                              </p:par>
+                              <p:par>
+                                <p:cTn id="23" presetID="1" presetClass="entr" presetSubtype="0" fill="hold" grpId="0" nodeType="withEffect">
+                                  <p:stCondLst>
+                                    <p:cond delay="0"/>
+                                  </p:stCondLst>
+                                  <p:childTnLst>
+                                    <p:set>
+                                      <p:cBhvr>
+                                        <p:cTn id="24" dur="1" fill="hold">
+                                          <p:stCondLst>
+                                            <p:cond delay="0"/>
+                                          </p:stCondLst>
+                                        </p:cTn>
+                                        <p:tgtEl>
+                                          <p:spTgt spid="6">
+                                            <p:txEl>
+                                              <p:pRg st="1" end="1"/>
+                                            </p:txEl>
+                                          </p:spTgt>
+                                        </p:tgtEl>
+                                        <p:attrNameLst>
+                                          <p:attrName>style.visibility</p:attrName>
+                                        </p:attrNameLst>
+                                      </p:cBhvr>
+                                      <p:to>
+                                        <p:strVal val="visible"/>
+                                      </p:to>
+                                    </p:set>
+                                  </p:childTnLst>
+                                </p:cTn>
+                              </p:par>
+                              <p:par>
+                                <p:cTn id="25" presetID="1" presetClass="entr" presetSubtype="0" fill="hold" grpId="0" nodeType="withEffect">
+                                  <p:stCondLst>
+                                    <p:cond delay="0"/>
+                                  </p:stCondLst>
+                                  <p:childTnLst>
+                                    <p:set>
+                                      <p:cBhvr>
+                                        <p:cTn id="26" dur="1" fill="hold">
+                                          <p:stCondLst>
+                                            <p:cond delay="0"/>
+                                          </p:stCondLst>
+                                        </p:cTn>
+                                        <p:tgtEl>
+                                          <p:spTgt spid="6">
+                                            <p:txEl>
+                                              <p:pRg st="2" end="2"/>
+                                            </p:txEl>
+                                          </p:spTgt>
+                                        </p:tgtEl>
+                                        <p:attrNameLst>
+                                          <p:attrName>style.visibility</p:attrName>
+                                        </p:attrNameLst>
+                                      </p:cBhvr>
+                                      <p:to>
+                                        <p:strVal val="visible"/>
+                                      </p:to>
+                                    </p:set>
+                                  </p:childTnLst>
+                                </p:cTn>
+                              </p:par>
+                            </p:childTnLst>
+                          </p:cTn>
+                        </p:par>
+                      </p:childTnLst>
+                    </p:cTn>
+                  </p:par>
+                  <p:par>
+                    <p:cTn id="27" fill="hold">
+                      <p:stCondLst>
+                        <p:cond delay="indefinite"/>
+                      </p:stCondLst>
+                      <p:childTnLst>
+                        <p:par>
+                          <p:cTn id="28" fill="hold">
+                            <p:stCondLst>
+                              <p:cond delay="0"/>
+                            </p:stCondLst>
+                            <p:childTnLst>
+                              <p:par>
+                                <p:cTn id="29" presetID="1" presetClass="entr" presetSubtype="0" fill="hold" grpId="0" nodeType="clickEffect">
+                                  <p:stCondLst>
+                                    <p:cond delay="0"/>
+                                  </p:stCondLst>
+                                  <p:childTnLst>
+                                    <p:set>
+                                      <p:cBhvr>
+                                        <p:cTn id="30" dur="1" fill="hold">
+                                          <p:stCondLst>
+                                            <p:cond delay="0"/>
+                                          </p:stCondLst>
+                                        </p:cTn>
+                                        <p:tgtEl>
+                                          <p:spTgt spid="6">
+                                            <p:txEl>
+                                              <p:pRg st="3" end="3"/>
+                                            </p:txEl>
+                                          </p:spTgt>
+                                        </p:tgtEl>
+                                        <p:attrNameLst>
+                                          <p:attrName>style.visibility</p:attrName>
+                                        </p:attrNameLst>
+                                      </p:cBhvr>
+                                      <p:to>
+                                        <p:strVal val="visible"/>
+                                      </p:to>
+                                    </p:set>
+                                  </p:childTnLst>
+                                </p:cTn>
+                              </p:par>
+                              <p:par>
+                                <p:cTn id="31" presetID="1" presetClass="entr" presetSubtype="0" fill="hold" grpId="0" nodeType="withEffect">
+                                  <p:stCondLst>
+                                    <p:cond delay="0"/>
+                                  </p:stCondLst>
+                                  <p:childTnLst>
+                                    <p:set>
+                                      <p:cBhvr>
+                                        <p:cTn id="32" dur="1" fill="hold">
+                                          <p:stCondLst>
+                                            <p:cond delay="0"/>
+                                          </p:stCondLst>
+                                        </p:cTn>
+                                        <p:tgtEl>
+                                          <p:spTgt spid="6">
+                                            <p:txEl>
+                                              <p:pRg st="4" end="4"/>
+                                            </p:txEl>
+                                          </p:spTgt>
+                                        </p:tgtEl>
+                                        <p:attrNameLst>
+                                          <p:attrName>style.visibility</p:attrName>
+                                        </p:attrNameLst>
+                                      </p:cBhvr>
+                                      <p:to>
+                                        <p:strVal val="visible"/>
+                                      </p:to>
+                                    </p:set>
+                                  </p:childTnLst>
+                                </p:cTn>
+                              </p:par>
+                              <p:par>
+                                <p:cTn id="33" presetID="1" presetClass="entr" presetSubtype="0" fill="hold" grpId="0" nodeType="withEffect">
+                                  <p:stCondLst>
+                                    <p:cond delay="0"/>
+                                  </p:stCondLst>
+                                  <p:childTnLst>
+                                    <p:set>
+                                      <p:cBhvr>
+                                        <p:cTn id="34" dur="1" fill="hold">
+                                          <p:stCondLst>
+                                            <p:cond delay="0"/>
+                                          </p:stCondLst>
+                                        </p:cTn>
+                                        <p:tgtEl>
+                                          <p:spTgt spid="6">
+                                            <p:txEl>
+                                              <p:pRg st="5" end="5"/>
+                                            </p:txEl>
+                                          </p:spTgt>
+                                        </p:tgtEl>
+                                        <p:attrNameLst>
+                                          <p:attrName>style.visibility</p:attrName>
+                                        </p:attrNameLst>
+                                      </p:cBhvr>
+                                      <p:to>
+                                        <p:strVal val="visible"/>
+                                      </p:to>
+                                    </p:set>
+                                  </p:childTnLst>
+                                </p:cTn>
+                              </p:par>
+                            </p:childTnLst>
+                          </p:cTn>
+                        </p:par>
+                      </p:childTnLst>
+                    </p:cTn>
+                  </p:par>
+                  <p:par>
+                    <p:cTn id="35" fill="hold">
+                      <p:stCondLst>
+                        <p:cond delay="indefinite"/>
+                      </p:stCondLst>
+                      <p:childTnLst>
+                        <p:par>
+                          <p:cTn id="36" fill="hold">
+                            <p:stCondLst>
+                              <p:cond delay="0"/>
+                            </p:stCondLst>
+                            <p:childTnLst>
+                              <p:par>
+                                <p:cTn id="37" presetID="1" presetClass="entr" presetSubtype="0" fill="hold" grpId="0" nodeType="clickEffect">
+                                  <p:stCondLst>
+                                    <p:cond delay="0"/>
+                                  </p:stCondLst>
+                                  <p:childTnLst>
+                                    <p:set>
+                                      <p:cBhvr>
+                                        <p:cTn id="38" dur="1" fill="hold">
+                                          <p:stCondLst>
+                                            <p:cond delay="0"/>
+                                          </p:stCondLst>
+                                        </p:cTn>
+                                        <p:tgtEl>
+                                          <p:spTgt spid="6">
+                                            <p:txEl>
+                                              <p:pRg st="6" end="6"/>
+                                            </p:txEl>
+                                          </p:spTgt>
+                                        </p:tgtEl>
+                                        <p:attrNameLst>
+                                          <p:attrName>style.visibility</p:attrName>
+                                        </p:attrNameLst>
+                                      </p:cBhvr>
+                                      <p:to>
+                                        <p:strVal val="visible"/>
+                                      </p:to>
+                                    </p:set>
+                                  </p:childTnLst>
+                                </p:cTn>
+                              </p:par>
+                              <p:par>
+                                <p:cTn id="39" presetID="1" presetClass="entr" presetSubtype="0" fill="hold" grpId="0" nodeType="withEffect">
+                                  <p:stCondLst>
+                                    <p:cond delay="0"/>
+                                  </p:stCondLst>
+                                  <p:childTnLst>
+                                    <p:set>
+                                      <p:cBhvr>
+                                        <p:cTn id="40" dur="1" fill="hold">
+                                          <p:stCondLst>
+                                            <p:cond delay="0"/>
+                                          </p:stCondLst>
+                                        </p:cTn>
+                                        <p:tgtEl>
+                                          <p:spTgt spid="6">
+                                            <p:txEl>
+                                              <p:pRg st="7" end="7"/>
+                                            </p:txEl>
+                                          </p:spTgt>
+                                        </p:tgtEl>
+                                        <p:attrNameLst>
+                                          <p:attrName>style.visibility</p:attrName>
+                                        </p:attrNameLst>
+                                      </p:cBhvr>
+                                      <p:to>
+                                        <p:strVal val="visible"/>
+                                      </p:to>
+                                    </p:set>
+                                  </p:childTnLst>
+                                </p:cTn>
+                              </p:par>
+                              <p:par>
+                                <p:cTn id="41" presetID="1" presetClass="entr" presetSubtype="0" fill="hold" grpId="0" nodeType="withEffect">
+                                  <p:stCondLst>
+                                    <p:cond delay="0"/>
+                                  </p:stCondLst>
+                                  <p:childTnLst>
+                                    <p:set>
+                                      <p:cBhvr>
+                                        <p:cTn id="42" dur="1" fill="hold">
+                                          <p:stCondLst>
+                                            <p:cond delay="0"/>
+                                          </p:stCondLst>
+                                        </p:cTn>
+                                        <p:tgtEl>
+                                          <p:spTgt spid="6">
+                                            <p:txEl>
+                                              <p:pRg st="8" end="8"/>
+                                            </p:txEl>
+                                          </p:spTgt>
+                                        </p:tgtEl>
+                                        <p:attrNameLst>
+                                          <p:attrName>style.visibility</p:attrName>
+                                        </p:attrNameLst>
+                                      </p:cBhvr>
+                                      <p:to>
+                                        <p:strVal val="visible"/>
+                                      </p:to>
+                                    </p:set>
+                                  </p:childTnLst>
+                                </p:cTn>
+                              </p:par>
+                            </p:childTnLst>
+                          </p:cTn>
+                        </p:par>
+                      </p:childTnLst>
+                    </p:cTn>
+                  </p:par>
+                </p:childTnLst>
+              </p:cTn>
+              <p:prevCondLst>
+                <p:cond evt="onPrev" delay="0">
+                  <p:tgtEl>
+                    <p:sldTgt/>
+                  </p:tgtEl>
+                </p:cond>
+              </p:prevCondLst>
+              <p:nextCondLst>
+                <p:cond evt="onNext" delay="0">
+                  <p:tgtEl>
+                    <p:sldTgt/>
+                  </p:tgtEl>
+                </p:cond>
+              </p:nextCondLst>
+            </p:seq>
+          </p:childTnLst>
+        </p:cTn>
+      </p:par>
+    </p:tnLst>
+    <p:bldLst>
+      <p:bldP spid="4" grpId="0" build="p"/>
+      <p:bldP spid="6" grpId="0" build="p"/>
+    </p:bldLst>
+  </p:timing>
 </p:sld>
 </file>
 
@@ -7913,7 +9509,7 @@
           <a:p>
             <a:r>
               <a:rPr lang="en-US" b="1" dirty="0" err="1"/>
-              <a:t>Oszályok</a:t>
+              <a:t>Osztályok</a:t>
             </a:r>
             <a:r>
               <a:rPr lang="en-US" b="1" dirty="0"/>
@@ -8020,7 +9616,7 @@
           <a:p>
             <a:r>
               <a:rPr lang="en-US" b="1" dirty="0" err="1"/>
-              <a:t>Oszályok</a:t>
+              <a:t>Osztályok</a:t>
             </a:r>
             <a:r>
               <a:rPr lang="en-US" b="1" dirty="0"/>
@@ -8127,7 +9723,7 @@
           <a:p>
             <a:r>
               <a:rPr lang="en-US" b="1" dirty="0" err="1"/>
-              <a:t>Oszályok</a:t>
+              <a:t>Osztályok</a:t>
             </a:r>
             <a:r>
               <a:rPr lang="en-US" b="1" dirty="0"/>
@@ -8234,7 +9830,7 @@
           <a:p>
             <a:r>
               <a:rPr lang="en-US" b="1" dirty="0" err="1"/>
-              <a:t>Oszályok</a:t>
+              <a:t>Osztályok</a:t>
             </a:r>
             <a:r>
               <a:rPr lang="en-US" b="1" dirty="0"/>
@@ -8714,6 +10310,232 @@
   <p:clrMapOvr>
     <a:masterClrMapping/>
   </p:clrMapOvr>
+  <p:timing>
+    <p:tnLst>
+      <p:par>
+        <p:cTn id="1" dur="indefinite" restart="never" nodeType="tmRoot">
+          <p:childTnLst>
+            <p:seq concurrent="1" nextAc="seek">
+              <p:cTn id="2" dur="indefinite" nodeType="mainSeq">
+                <p:childTnLst>
+                  <p:par>
+                    <p:cTn id="3" fill="hold">
+                      <p:stCondLst>
+                        <p:cond delay="indefinite"/>
+                      </p:stCondLst>
+                      <p:childTnLst>
+                        <p:par>
+                          <p:cTn id="4" fill="hold">
+                            <p:stCondLst>
+                              <p:cond delay="0"/>
+                            </p:stCondLst>
+                            <p:childTnLst>
+                              <p:par>
+                                <p:cTn id="5" presetID="1" presetClass="entr" presetSubtype="0" fill="hold" nodeType="clickEffect">
+                                  <p:stCondLst>
+                                    <p:cond delay="0"/>
+                                  </p:stCondLst>
+                                  <p:childTnLst>
+                                    <p:set>
+                                      <p:cBhvr>
+                                        <p:cTn id="6" dur="1" fill="hold">
+                                          <p:stCondLst>
+                                            <p:cond delay="0"/>
+                                          </p:stCondLst>
+                                        </p:cTn>
+                                        <p:tgtEl>
+                                          <p:spTgt spid="3">
+                                            <p:txEl>
+                                              <p:pRg st="0" end="0"/>
+                                            </p:txEl>
+                                          </p:spTgt>
+                                        </p:tgtEl>
+                                        <p:attrNameLst>
+                                          <p:attrName>style.visibility</p:attrName>
+                                        </p:attrNameLst>
+                                      </p:cBhvr>
+                                      <p:to>
+                                        <p:strVal val="visible"/>
+                                      </p:to>
+                                    </p:set>
+                                  </p:childTnLst>
+                                </p:cTn>
+                              </p:par>
+                            </p:childTnLst>
+                          </p:cTn>
+                        </p:par>
+                      </p:childTnLst>
+                    </p:cTn>
+                  </p:par>
+                  <p:par>
+                    <p:cTn id="7" fill="hold">
+                      <p:stCondLst>
+                        <p:cond delay="indefinite"/>
+                      </p:stCondLst>
+                      <p:childTnLst>
+                        <p:par>
+                          <p:cTn id="8" fill="hold">
+                            <p:stCondLst>
+                              <p:cond delay="0"/>
+                            </p:stCondLst>
+                            <p:childTnLst>
+                              <p:par>
+                                <p:cTn id="9" presetID="1" presetClass="entr" presetSubtype="0" fill="hold" nodeType="clickEffect">
+                                  <p:stCondLst>
+                                    <p:cond delay="0"/>
+                                  </p:stCondLst>
+                                  <p:childTnLst>
+                                    <p:set>
+                                      <p:cBhvr>
+                                        <p:cTn id="10" dur="1" fill="hold">
+                                          <p:stCondLst>
+                                            <p:cond delay="0"/>
+                                          </p:stCondLst>
+                                        </p:cTn>
+                                        <p:tgtEl>
+                                          <p:spTgt spid="3">
+                                            <p:txEl>
+                                              <p:pRg st="1" end="1"/>
+                                            </p:txEl>
+                                          </p:spTgt>
+                                        </p:tgtEl>
+                                        <p:attrNameLst>
+                                          <p:attrName>style.visibility</p:attrName>
+                                        </p:attrNameLst>
+                                      </p:cBhvr>
+                                      <p:to>
+                                        <p:strVal val="visible"/>
+                                      </p:to>
+                                    </p:set>
+                                  </p:childTnLst>
+                                </p:cTn>
+                              </p:par>
+                            </p:childTnLst>
+                          </p:cTn>
+                        </p:par>
+                      </p:childTnLst>
+                    </p:cTn>
+                  </p:par>
+                  <p:par>
+                    <p:cTn id="11" fill="hold">
+                      <p:stCondLst>
+                        <p:cond delay="indefinite"/>
+                      </p:stCondLst>
+                      <p:childTnLst>
+                        <p:par>
+                          <p:cTn id="12" fill="hold">
+                            <p:stCondLst>
+                              <p:cond delay="0"/>
+                            </p:stCondLst>
+                            <p:childTnLst>
+                              <p:par>
+                                <p:cTn id="13" presetID="1" presetClass="entr" presetSubtype="0" fill="hold" nodeType="clickEffect">
+                                  <p:stCondLst>
+                                    <p:cond delay="0"/>
+                                  </p:stCondLst>
+                                  <p:childTnLst>
+                                    <p:set>
+                                      <p:cBhvr>
+                                        <p:cTn id="14" dur="1" fill="hold">
+                                          <p:stCondLst>
+                                            <p:cond delay="0"/>
+                                          </p:stCondLst>
+                                        </p:cTn>
+                                        <p:tgtEl>
+                                          <p:spTgt spid="3">
+                                            <p:txEl>
+                                              <p:pRg st="2" end="2"/>
+                                            </p:txEl>
+                                          </p:spTgt>
+                                        </p:tgtEl>
+                                        <p:attrNameLst>
+                                          <p:attrName>style.visibility</p:attrName>
+                                        </p:attrNameLst>
+                                      </p:cBhvr>
+                                      <p:to>
+                                        <p:strVal val="visible"/>
+                                      </p:to>
+                                    </p:set>
+                                  </p:childTnLst>
+                                </p:cTn>
+                              </p:par>
+                            </p:childTnLst>
+                          </p:cTn>
+                        </p:par>
+                      </p:childTnLst>
+                    </p:cTn>
+                  </p:par>
+                  <p:par>
+                    <p:cTn id="15" fill="hold">
+                      <p:stCondLst>
+                        <p:cond delay="indefinite"/>
+                      </p:stCondLst>
+                      <p:childTnLst>
+                        <p:par>
+                          <p:cTn id="16" fill="hold">
+                            <p:stCondLst>
+                              <p:cond delay="0"/>
+                            </p:stCondLst>
+                            <p:childTnLst>
+                              <p:par>
+                                <p:cTn id="17" presetID="1" presetClass="entr" presetSubtype="0" fill="hold" nodeType="clickEffect">
+                                  <p:stCondLst>
+                                    <p:cond delay="0"/>
+                                  </p:stCondLst>
+                                  <p:childTnLst>
+                                    <p:set>
+                                      <p:cBhvr>
+                                        <p:cTn id="18" dur="1" fill="hold">
+                                          <p:stCondLst>
+                                            <p:cond delay="0"/>
+                                          </p:stCondLst>
+                                        </p:cTn>
+                                        <p:tgtEl>
+                                          <p:spTgt spid="3">
+                                            <p:txEl>
+                                              <p:pRg st="3" end="3"/>
+                                            </p:txEl>
+                                          </p:spTgt>
+                                        </p:tgtEl>
+                                        <p:attrNameLst>
+                                          <p:attrName>style.visibility</p:attrName>
+                                        </p:attrNameLst>
+                                      </p:cBhvr>
+                                      <p:to>
+                                        <p:strVal val="visible"/>
+                                      </p:to>
+                                    </p:set>
+                                  </p:childTnLst>
+                                </p:cTn>
+                              </p:par>
+                            </p:childTnLst>
+                          </p:cTn>
+                        </p:par>
+                      </p:childTnLst>
+                    </p:cTn>
+                  </p:par>
+                </p:childTnLst>
+              </p:cTn>
+              <p:prevCondLst>
+                <p:cond evt="onPrev" delay="0">
+                  <p:tgtEl>
+                    <p:sldTgt/>
+                  </p:tgtEl>
+                </p:cond>
+              </p:prevCondLst>
+              <p:nextCondLst>
+                <p:cond evt="onNext" delay="0">
+                  <p:tgtEl>
+                    <p:sldTgt/>
+                  </p:tgtEl>
+                </p:cond>
+              </p:nextCondLst>
+            </p:seq>
+          </p:childTnLst>
+        </p:cTn>
+      </p:par>
+    </p:tnLst>
+  </p:timing>
 </p:sld>
 </file>
 
@@ -8995,6 +10817,183 @@
   <p:clrMapOvr>
     <a:masterClrMapping/>
   </p:clrMapOvr>
+  <p:timing>
+    <p:tnLst>
+      <p:par>
+        <p:cTn id="1" dur="indefinite" restart="never" nodeType="tmRoot">
+          <p:childTnLst>
+            <p:seq concurrent="1" nextAc="seek">
+              <p:cTn id="2" dur="indefinite" nodeType="mainSeq">
+                <p:childTnLst>
+                  <p:par>
+                    <p:cTn id="3" fill="hold">
+                      <p:stCondLst>
+                        <p:cond delay="indefinite"/>
+                      </p:stCondLst>
+                      <p:childTnLst>
+                        <p:par>
+                          <p:cTn id="4" fill="hold">
+                            <p:stCondLst>
+                              <p:cond delay="0"/>
+                            </p:stCondLst>
+                            <p:childTnLst>
+                              <p:par>
+                                <p:cTn id="5" presetID="1" presetClass="entr" presetSubtype="0" fill="hold" nodeType="clickEffect">
+                                  <p:stCondLst>
+                                    <p:cond delay="0"/>
+                                  </p:stCondLst>
+                                  <p:childTnLst>
+                                    <p:set>
+                                      <p:cBhvr>
+                                        <p:cTn id="6" dur="1" fill="hold">
+                                          <p:stCondLst>
+                                            <p:cond delay="0"/>
+                                          </p:stCondLst>
+                                        </p:cTn>
+                                        <p:tgtEl>
+                                          <p:spTgt spid="3">
+                                            <p:txEl>
+                                              <p:pRg st="0" end="0"/>
+                                            </p:txEl>
+                                          </p:spTgt>
+                                        </p:tgtEl>
+                                        <p:attrNameLst>
+                                          <p:attrName>style.visibility</p:attrName>
+                                        </p:attrNameLst>
+                                      </p:cBhvr>
+                                      <p:to>
+                                        <p:strVal val="visible"/>
+                                      </p:to>
+                                    </p:set>
+                                  </p:childTnLst>
+                                </p:cTn>
+                              </p:par>
+                            </p:childTnLst>
+                          </p:cTn>
+                        </p:par>
+                      </p:childTnLst>
+                    </p:cTn>
+                  </p:par>
+                  <p:par>
+                    <p:cTn id="7" fill="hold">
+                      <p:stCondLst>
+                        <p:cond delay="indefinite"/>
+                      </p:stCondLst>
+                      <p:childTnLst>
+                        <p:par>
+                          <p:cTn id="8" fill="hold">
+                            <p:stCondLst>
+                              <p:cond delay="0"/>
+                            </p:stCondLst>
+                            <p:childTnLst>
+                              <p:par>
+                                <p:cTn id="9" presetID="1" presetClass="entr" presetSubtype="0" fill="hold" nodeType="clickEffect">
+                                  <p:stCondLst>
+                                    <p:cond delay="0"/>
+                                  </p:stCondLst>
+                                  <p:childTnLst>
+                                    <p:set>
+                                      <p:cBhvr>
+                                        <p:cTn id="10" dur="1" fill="hold">
+                                          <p:stCondLst>
+                                            <p:cond delay="0"/>
+                                          </p:stCondLst>
+                                        </p:cTn>
+                                        <p:tgtEl>
+                                          <p:spTgt spid="3">
+                                            <p:txEl>
+                                              <p:pRg st="1" end="1"/>
+                                            </p:txEl>
+                                          </p:spTgt>
+                                        </p:tgtEl>
+                                        <p:attrNameLst>
+                                          <p:attrName>style.visibility</p:attrName>
+                                        </p:attrNameLst>
+                                      </p:cBhvr>
+                                      <p:to>
+                                        <p:strVal val="visible"/>
+                                      </p:to>
+                                    </p:set>
+                                  </p:childTnLst>
+                                </p:cTn>
+                              </p:par>
+                            </p:childTnLst>
+                          </p:cTn>
+                        </p:par>
+                      </p:childTnLst>
+                    </p:cTn>
+                  </p:par>
+                  <p:par>
+                    <p:cTn id="11" fill="hold">
+                      <p:stCondLst>
+                        <p:cond delay="indefinite"/>
+                      </p:stCondLst>
+                      <p:childTnLst>
+                        <p:par>
+                          <p:cTn id="12" fill="hold">
+                            <p:stCondLst>
+                              <p:cond delay="0"/>
+                            </p:stCondLst>
+                            <p:childTnLst>
+                              <p:par>
+                                <p:cTn id="13" presetID="1" presetClass="entr" presetSubtype="0" fill="hold" nodeType="clickEffect">
+                                  <p:stCondLst>
+                                    <p:cond delay="0"/>
+                                  </p:stCondLst>
+                                  <p:childTnLst>
+                                    <p:set>
+                                      <p:cBhvr>
+                                        <p:cTn id="14" dur="1" fill="hold">
+                                          <p:stCondLst>
+                                            <p:cond delay="0"/>
+                                          </p:stCondLst>
+                                        </p:cTn>
+                                        <p:tgtEl>
+                                          <p:spTgt spid="3">
+                                            <p:txEl>
+                                              <p:pRg st="2" end="2"/>
+                                            </p:txEl>
+                                          </p:spTgt>
+                                        </p:tgtEl>
+                                        <p:attrNameLst>
+                                          <p:attrName>style.visibility</p:attrName>
+                                        </p:attrNameLst>
+                                      </p:cBhvr>
+                                      <p:to>
+                                        <p:strVal val="visible"/>
+                                      </p:to>
+                                    </p:set>
+                                  </p:childTnLst>
+                                </p:cTn>
+                              </p:par>
+                            </p:childTnLst>
+                          </p:cTn>
+                        </p:par>
+                      </p:childTnLst>
+                    </p:cTn>
+                  </p:par>
+                </p:childTnLst>
+              </p:cTn>
+              <p:prevCondLst>
+                <p:cond evt="onPrev" delay="0">
+                  <p:tgtEl>
+                    <p:sldTgt/>
+                  </p:tgtEl>
+                </p:cond>
+              </p:prevCondLst>
+              <p:nextCondLst>
+                <p:cond evt="onNext" delay="0">
+                  <p:tgtEl>
+                    <p:sldTgt/>
+                  </p:tgtEl>
+                </p:cond>
+              </p:nextCondLst>
+            </p:seq>
+          </p:childTnLst>
+        </p:cTn>
+      </p:par>
+    </p:tnLst>
+  </p:timing>
 </p:sld>
 </file>
 

</xml_diff>